<commit_message>
feat: session 05 nest.js scripts added
</commit_message>
<xml_diff>
--- a/nestjs/nestjs-05.pptx
+++ b/nestjs/nestjs-05.pptx
@@ -5,7 +5,7 @@
     <p:sldMasterId id="2147483705" r:id="rId1"/>
   </p:sldMasterIdLst>
   <p:notesMasterIdLst>
-    <p:notesMasterId r:id="rId11"/>
+    <p:notesMasterId r:id="rId17"/>
   </p:notesMasterIdLst>
   <p:sldIdLst>
     <p:sldId id="259" r:id="rId2"/>
@@ -16,7 +16,13 @@
     <p:sldId id="326" r:id="rId7"/>
     <p:sldId id="333" r:id="rId8"/>
     <p:sldId id="327" r:id="rId9"/>
-    <p:sldId id="320" r:id="rId10"/>
+    <p:sldId id="335" r:id="rId10"/>
+    <p:sldId id="336" r:id="rId11"/>
+    <p:sldId id="337" r:id="rId12"/>
+    <p:sldId id="338" r:id="rId13"/>
+    <p:sldId id="339" r:id="rId14"/>
+    <p:sldId id="340" r:id="rId15"/>
+    <p:sldId id="320" r:id="rId16"/>
   </p:sldIdLst>
   <p:sldSz cx="12192000" cy="6858000"/>
   <p:notesSz cx="6858000" cy="9144000"/>
@@ -596,7 +602,7 @@
           <a:p>
             <a:fld id="{0FE84E6F-3671-472C-BE6F-A37BC298F4AB}" type="slidenum">
               <a:rPr lang="en-US" smtClean="0"/>
-              <a:t>9</a:t>
+              <a:t>15</a:t>
             </a:fld>
             <a:endParaRPr lang="en-US"/>
           </a:p>
@@ -6821,6 +6827,1624 @@
 </p:sld>
 </file>
 
+<file path=ppt/slides/slide10.xml><?xml version="1.0" encoding="utf-8"?>
+<p:sld xmlns:a="http://schemas.openxmlformats.org/drawingml/2006/main" xmlns:r="http://schemas.openxmlformats.org/officeDocument/2006/relationships" xmlns:p="http://schemas.openxmlformats.org/presentationml/2006/main">
+  <p:cSld>
+    <p:spTree>
+      <p:nvGrpSpPr>
+        <p:cNvPr id="1" name=""/>
+        <p:cNvGrpSpPr/>
+        <p:nvPr/>
+      </p:nvGrpSpPr>
+      <p:grpSpPr>
+        <a:xfrm>
+          <a:off x="0" y="0"/>
+          <a:ext cx="0" cy="0"/>
+          <a:chOff x="0" y="0"/>
+          <a:chExt cx="0" cy="0"/>
+        </a:xfrm>
+      </p:grpSpPr>
+      <p:sp>
+        <p:nvSpPr>
+          <p:cNvPr id="2" name="Title 1">
+            <a:extLst>
+              <a:ext uri="{FF2B5EF4-FFF2-40B4-BE49-F238E27FC236}">
+                <a16:creationId xmlns:a16="http://schemas.microsoft.com/office/drawing/2014/main" id="{58640BC4-C913-4DC3-8358-73EF6F3D53AE}"/>
+              </a:ext>
+            </a:extLst>
+          </p:cNvPr>
+          <p:cNvSpPr>
+            <a:spLocks noGrp="1"/>
+          </p:cNvSpPr>
+          <p:nvPr>
+            <p:ph type="title"/>
+          </p:nvPr>
+        </p:nvSpPr>
+        <p:spPr/>
+        <p:txBody>
+          <a:bodyPr/>
+          <a:lstStyle/>
+          <a:p>
+            <a:r>
+              <a:rPr lang="en-US" dirty="0"/>
+              <a:t>Demo</a:t>
+            </a:r>
+          </a:p>
+        </p:txBody>
+      </p:sp>
+      <p:sp>
+        <p:nvSpPr>
+          <p:cNvPr id="3" name="Content Placeholder 2">
+            <a:extLst>
+              <a:ext uri="{FF2B5EF4-FFF2-40B4-BE49-F238E27FC236}">
+                <a16:creationId xmlns:a16="http://schemas.microsoft.com/office/drawing/2014/main" id="{C4F83B04-FBF0-484A-B113-7CF48950F75F}"/>
+              </a:ext>
+            </a:extLst>
+          </p:cNvPr>
+          <p:cNvSpPr>
+            <a:spLocks noGrp="1"/>
+          </p:cNvSpPr>
+          <p:nvPr>
+            <p:ph idx="1"/>
+          </p:nvPr>
+        </p:nvSpPr>
+        <p:spPr/>
+        <p:txBody>
+          <a:bodyPr>
+            <a:normAutofit fontScale="92500" lnSpcReduction="20000"/>
+          </a:bodyPr>
+          <a:lstStyle/>
+          <a:p>
+            <a:r>
+              <a:rPr lang="en-US" dirty="0"/>
+              <a:t>Our application needs to run on many environments</a:t>
+            </a:r>
+          </a:p>
+          <a:p>
+            <a:pPr lvl="1"/>
+            <a:r>
+              <a:rPr lang="en-US" dirty="0"/>
+              <a:t>Development</a:t>
+            </a:r>
+          </a:p>
+          <a:p>
+            <a:pPr lvl="1"/>
+            <a:r>
+              <a:rPr lang="en-US" dirty="0"/>
+              <a:t>Staging</a:t>
+            </a:r>
+          </a:p>
+          <a:p>
+            <a:pPr lvl="1"/>
+            <a:r>
+              <a:rPr lang="en-US" dirty="0"/>
+              <a:t>Production</a:t>
+            </a:r>
+          </a:p>
+          <a:p>
+            <a:r>
+              <a:rPr lang="en-US" dirty="0" err="1"/>
+              <a:t>ConfigModule</a:t>
+            </a:r>
+            <a:r>
+              <a:rPr lang="en-US" dirty="0"/>
+              <a:t> </a:t>
+            </a:r>
+            <a:r>
+              <a:rPr lang="en-US" dirty="0">
+                <a:sym typeface="Wingdings" panose="05000000000000000000" pitchFamily="2" charset="2"/>
+              </a:rPr>
+              <a:t> is the key</a:t>
+            </a:r>
+          </a:p>
+          <a:p>
+            <a:pPr lvl="1"/>
+            <a:r>
+              <a:rPr lang="en-US" dirty="0" err="1">
+                <a:latin typeface="Consolas" panose="020B0609020204030204" pitchFamily="49" charset="0"/>
+                <a:sym typeface="Wingdings" panose="05000000000000000000" pitchFamily="2" charset="2"/>
+              </a:rPr>
+              <a:t>npm</a:t>
+            </a:r>
+            <a:r>
+              <a:rPr lang="en-US" dirty="0">
+                <a:latin typeface="Consolas" panose="020B0609020204030204" pitchFamily="49" charset="0"/>
+                <a:sym typeface="Wingdings" panose="05000000000000000000" pitchFamily="2" charset="2"/>
+              </a:rPr>
+              <a:t> install @nestjs/config</a:t>
+            </a:r>
+          </a:p>
+          <a:p>
+            <a:pPr lvl="1"/>
+            <a:r>
+              <a:rPr lang="en-US" dirty="0">
+                <a:sym typeface="Wingdings" panose="05000000000000000000" pitchFamily="2" charset="2"/>
+              </a:rPr>
+              <a:t>Then add </a:t>
+            </a:r>
+            <a:r>
+              <a:rPr lang="en-US" dirty="0" err="1">
+                <a:latin typeface="Consolas" panose="020B0609020204030204" pitchFamily="49" charset="0"/>
+                <a:sym typeface="Wingdings" panose="05000000000000000000" pitchFamily="2" charset="2"/>
+              </a:rPr>
+              <a:t>ConfigModule</a:t>
+            </a:r>
+            <a:r>
+              <a:rPr lang="en-US" dirty="0">
+                <a:sym typeface="Wingdings" panose="05000000000000000000" pitchFamily="2" charset="2"/>
+              </a:rPr>
+              <a:t> to the </a:t>
+            </a:r>
+            <a:r>
+              <a:rPr lang="en-US" dirty="0">
+                <a:latin typeface="Consolas" panose="020B0609020204030204" pitchFamily="49" charset="0"/>
+                <a:sym typeface="Wingdings" panose="05000000000000000000" pitchFamily="2" charset="2"/>
+              </a:rPr>
+              <a:t>AppModule</a:t>
+            </a:r>
+            <a:r>
+              <a:rPr lang="en-US" dirty="0">
+                <a:sym typeface="Wingdings" panose="05000000000000000000" pitchFamily="2" charset="2"/>
+              </a:rPr>
+              <a:t> (</a:t>
+            </a:r>
+            <a:r>
+              <a:rPr lang="en-US" dirty="0">
+                <a:latin typeface="Consolas" panose="020B0609020204030204" pitchFamily="49" charset="0"/>
+                <a:sym typeface="Wingdings" panose="05000000000000000000" pitchFamily="2" charset="2"/>
+              </a:rPr>
+              <a:t>forRoot</a:t>
+            </a:r>
+            <a:r>
+              <a:rPr lang="en-US" dirty="0">
+                <a:sym typeface="Wingdings" panose="05000000000000000000" pitchFamily="2" charset="2"/>
+              </a:rPr>
+              <a:t> static function)</a:t>
+            </a:r>
+          </a:p>
+          <a:p>
+            <a:pPr lvl="2"/>
+            <a:r>
+              <a:rPr lang="en-US" dirty="0">
+                <a:sym typeface="Wingdings" panose="05000000000000000000" pitchFamily="2" charset="2"/>
+              </a:rPr>
+              <a:t>Here </a:t>
+            </a:r>
+            <a:r>
+              <a:rPr lang="en-US" sz="2100" dirty="0" err="1">
+                <a:latin typeface="Consolas" panose="020B0609020204030204" pitchFamily="49" charset="0"/>
+                <a:sym typeface="Wingdings" panose="05000000000000000000" pitchFamily="2" charset="2"/>
+              </a:rPr>
+              <a:t>process.env</a:t>
+            </a:r>
+            <a:r>
+              <a:rPr lang="en-US" sz="2100" dirty="0">
+                <a:latin typeface="Consolas" panose="020B0609020204030204" pitchFamily="49" charset="0"/>
+                <a:sym typeface="Wingdings" panose="05000000000000000000" pitchFamily="2" charset="2"/>
+              </a:rPr>
+              <a:t> </a:t>
+            </a:r>
+            <a:r>
+              <a:rPr lang="en-US" dirty="0">
+                <a:sym typeface="Wingdings" panose="05000000000000000000" pitchFamily="2" charset="2"/>
+              </a:rPr>
+              <a:t>will initialized by your .env file</a:t>
+            </a:r>
+          </a:p>
+          <a:p>
+            <a:pPr lvl="1"/>
+            <a:r>
+              <a:rPr lang="en-US" dirty="0">
+                <a:sym typeface="Wingdings" panose="05000000000000000000" pitchFamily="2" charset="2"/>
+              </a:rPr>
+              <a:t>There it comes </a:t>
+            </a:r>
+            <a:r>
+              <a:rPr lang="en-US" dirty="0">
+                <a:latin typeface="Consolas" panose="020B0609020204030204" pitchFamily="49" charset="0"/>
+                <a:sym typeface="Wingdings" panose="05000000000000000000" pitchFamily="2" charset="2"/>
+              </a:rPr>
+              <a:t>.en</a:t>
+            </a:r>
+            <a:r>
+              <a:rPr lang="en-US" dirty="0">
+                <a:sym typeface="Wingdings" panose="05000000000000000000" pitchFamily="2" charset="2"/>
+              </a:rPr>
+              <a:t>v file </a:t>
+            </a:r>
+          </a:p>
+          <a:p>
+            <a:pPr lvl="1"/>
+            <a:r>
+              <a:rPr lang="en-US" dirty="0">
+                <a:sym typeface="Wingdings" panose="05000000000000000000" pitchFamily="2" charset="2"/>
+              </a:rPr>
+              <a:t>Let’s add database config options to the </a:t>
+            </a:r>
+            <a:r>
+              <a:rPr lang="en-US" dirty="0">
+                <a:latin typeface="Consolas" panose="020B0609020204030204" pitchFamily="49" charset="0"/>
+                <a:sym typeface="Wingdings" panose="05000000000000000000" pitchFamily="2" charset="2"/>
+              </a:rPr>
+              <a:t>.env </a:t>
+            </a:r>
+            <a:r>
+              <a:rPr lang="en-US" dirty="0">
+                <a:sym typeface="Wingdings" panose="05000000000000000000" pitchFamily="2" charset="2"/>
+              </a:rPr>
+              <a:t>file	</a:t>
+            </a:r>
+          </a:p>
+          <a:p>
+            <a:pPr lvl="1"/>
+            <a:r>
+              <a:rPr lang="en-US" dirty="0">
+                <a:latin typeface="Consolas" panose="020B0609020204030204" pitchFamily="49" charset="0"/>
+                <a:sym typeface="Wingdings" panose="05000000000000000000" pitchFamily="2" charset="2"/>
+              </a:rPr>
+              <a:t>.env </a:t>
+            </a:r>
+            <a:r>
+              <a:rPr lang="en-US" dirty="0">
+                <a:sym typeface="Wingdings" panose="05000000000000000000" pitchFamily="2" charset="2"/>
+              </a:rPr>
+              <a:t>file should not track by </a:t>
+            </a:r>
+            <a:r>
+              <a:rPr lang="en-US" dirty="0">
+                <a:latin typeface="Consolas" panose="020B0609020204030204" pitchFamily="49" charset="0"/>
+                <a:sym typeface="Wingdings" panose="05000000000000000000" pitchFamily="2" charset="2"/>
+              </a:rPr>
+              <a:t>git</a:t>
+            </a:r>
+          </a:p>
+          <a:p>
+            <a:pPr lvl="2"/>
+            <a:r>
+              <a:rPr lang="en-US" dirty="0">
+                <a:sym typeface="Wingdings" panose="05000000000000000000" pitchFamily="2" charset="2"/>
+              </a:rPr>
+              <a:t>Add it to the </a:t>
+            </a:r>
+            <a:r>
+              <a:rPr lang="en-US" sz="2100" dirty="0">
+                <a:latin typeface="Consolas" panose="020B0609020204030204" pitchFamily="49" charset="0"/>
+                <a:sym typeface="Wingdings" panose="05000000000000000000" pitchFamily="2" charset="2"/>
+              </a:rPr>
+              <a:t>.</a:t>
+            </a:r>
+            <a:r>
+              <a:rPr lang="en-US" sz="2100" dirty="0" err="1">
+                <a:latin typeface="Consolas" panose="020B0609020204030204" pitchFamily="49" charset="0"/>
+                <a:sym typeface="Wingdings" panose="05000000000000000000" pitchFamily="2" charset="2"/>
+              </a:rPr>
+              <a:t>gitignore</a:t>
+            </a:r>
+            <a:endParaRPr lang="en-US" sz="2100" dirty="0">
+              <a:latin typeface="Consolas" panose="020B0609020204030204" pitchFamily="49" charset="0"/>
+            </a:endParaRPr>
+          </a:p>
+        </p:txBody>
+      </p:sp>
+      <p:sp>
+        <p:nvSpPr>
+          <p:cNvPr id="4" name="Footer Placeholder 3">
+            <a:extLst>
+              <a:ext uri="{FF2B5EF4-FFF2-40B4-BE49-F238E27FC236}">
+                <a16:creationId xmlns:a16="http://schemas.microsoft.com/office/drawing/2014/main" id="{80C2A09D-A5FC-4256-98A2-17B6276473F2}"/>
+              </a:ext>
+            </a:extLst>
+          </p:cNvPr>
+          <p:cNvSpPr>
+            <a:spLocks noGrp="1"/>
+          </p:cNvSpPr>
+          <p:nvPr>
+            <p:ph type="ftr" sz="quarter" idx="11"/>
+          </p:nvPr>
+        </p:nvSpPr>
+        <p:spPr/>
+        <p:txBody>
+          <a:bodyPr/>
+          <a:lstStyle/>
+          <a:p>
+            <a:r>
+              <a:rPr lang="en-US"/>
+              <a:t>Nodejs Basics</a:t>
+            </a:r>
+            <a:endParaRPr lang="en-US" dirty="0"/>
+          </a:p>
+        </p:txBody>
+      </p:sp>
+      <p:sp>
+        <p:nvSpPr>
+          <p:cNvPr id="5" name="Slide Number Placeholder 4">
+            <a:extLst>
+              <a:ext uri="{FF2B5EF4-FFF2-40B4-BE49-F238E27FC236}">
+                <a16:creationId xmlns:a16="http://schemas.microsoft.com/office/drawing/2014/main" id="{04B4C4A9-44CA-48AA-9DBA-FD1533A3A97B}"/>
+              </a:ext>
+            </a:extLst>
+          </p:cNvPr>
+          <p:cNvSpPr>
+            <a:spLocks noGrp="1"/>
+          </p:cNvSpPr>
+          <p:nvPr>
+            <p:ph type="sldNum" sz="quarter" idx="12"/>
+          </p:nvPr>
+        </p:nvSpPr>
+        <p:spPr/>
+        <p:txBody>
+          <a:bodyPr/>
+          <a:lstStyle/>
+          <a:p>
+            <a:fld id="{3A98EE3D-8CD1-4C3F-BD1C-C98C9596463C}" type="slidenum">
+              <a:rPr lang="en-US" smtClean="0"/>
+              <a:t>10</a:t>
+            </a:fld>
+            <a:endParaRPr lang="en-US" dirty="0"/>
+          </a:p>
+        </p:txBody>
+      </p:sp>
+    </p:spTree>
+    <p:extLst>
+      <p:ext uri="{BB962C8B-B14F-4D97-AF65-F5344CB8AC3E}">
+        <p14:creationId xmlns:p14="http://schemas.microsoft.com/office/powerpoint/2010/main" val="3118906878"/>
+      </p:ext>
+    </p:extLst>
+  </p:cSld>
+  <p:clrMapOvr>
+    <a:masterClrMapping/>
+  </p:clrMapOvr>
+</p:sld>
+</file>
+
+<file path=ppt/slides/slide11.xml><?xml version="1.0" encoding="utf-8"?>
+<p:sld xmlns:a="http://schemas.openxmlformats.org/drawingml/2006/main" xmlns:r="http://schemas.openxmlformats.org/officeDocument/2006/relationships" xmlns:p="http://schemas.openxmlformats.org/presentationml/2006/main">
+  <p:cSld>
+    <p:spTree>
+      <p:nvGrpSpPr>
+        <p:cNvPr id="1" name=""/>
+        <p:cNvGrpSpPr/>
+        <p:nvPr/>
+      </p:nvGrpSpPr>
+      <p:grpSpPr>
+        <a:xfrm>
+          <a:off x="0" y="0"/>
+          <a:ext cx="0" cy="0"/>
+          <a:chOff x="0" y="0"/>
+          <a:chExt cx="0" cy="0"/>
+        </a:xfrm>
+      </p:grpSpPr>
+      <p:sp>
+        <p:nvSpPr>
+          <p:cNvPr id="2" name="Title 1">
+            <a:extLst>
+              <a:ext uri="{FF2B5EF4-FFF2-40B4-BE49-F238E27FC236}">
+                <a16:creationId xmlns:a16="http://schemas.microsoft.com/office/drawing/2014/main" id="{E369ABA3-9D85-422C-9E1E-A7EDF9D457D0}"/>
+              </a:ext>
+            </a:extLst>
+          </p:cNvPr>
+          <p:cNvSpPr>
+            <a:spLocks noGrp="1"/>
+          </p:cNvSpPr>
+          <p:nvPr>
+            <p:ph type="title"/>
+          </p:nvPr>
+        </p:nvSpPr>
+        <p:spPr/>
+        <p:txBody>
+          <a:bodyPr/>
+          <a:lstStyle/>
+          <a:p>
+            <a:r>
+              <a:rPr lang="en-US" dirty="0" err="1"/>
+              <a:t>Demp</a:t>
+            </a:r>
+            <a:endParaRPr lang="en-US" dirty="0"/>
+          </a:p>
+        </p:txBody>
+      </p:sp>
+      <p:sp>
+        <p:nvSpPr>
+          <p:cNvPr id="3" name="Content Placeholder 2">
+            <a:extLst>
+              <a:ext uri="{FF2B5EF4-FFF2-40B4-BE49-F238E27FC236}">
+                <a16:creationId xmlns:a16="http://schemas.microsoft.com/office/drawing/2014/main" id="{B07A233A-0DA8-42C5-BEEC-92F04B58F9A8}"/>
+              </a:ext>
+            </a:extLst>
+          </p:cNvPr>
+          <p:cNvSpPr>
+            <a:spLocks noGrp="1"/>
+          </p:cNvSpPr>
+          <p:nvPr>
+            <p:ph idx="1"/>
+          </p:nvPr>
+        </p:nvSpPr>
+        <p:spPr/>
+        <p:txBody>
+          <a:bodyPr/>
+          <a:lstStyle/>
+          <a:p>
+            <a:r>
+              <a:rPr lang="en-US" dirty="0" err="1"/>
+              <a:t>ConfigModule</a:t>
+            </a:r>
+            <a:endParaRPr lang="en-US" dirty="0"/>
+          </a:p>
+          <a:p>
+            <a:pPr lvl="1"/>
+            <a:r>
+              <a:rPr lang="en-US" dirty="0"/>
+              <a:t>How to change the </a:t>
+            </a:r>
+            <a:r>
+              <a:rPr lang="en-US" sz="1900" dirty="0">
+                <a:latin typeface="Consolas" panose="020B0609020204030204" pitchFamily="49" charset="0"/>
+              </a:rPr>
+              <a:t>.env </a:t>
+            </a:r>
+            <a:r>
+              <a:rPr lang="en-US" dirty="0"/>
+              <a:t>path from root to somewhere else?</a:t>
+            </a:r>
+          </a:p>
+          <a:p>
+            <a:pPr lvl="2"/>
+            <a:r>
+              <a:rPr lang="en-US" sz="1900" dirty="0" err="1">
+                <a:latin typeface="Consolas" panose="020B0609020204030204" pitchFamily="49" charset="0"/>
+              </a:rPr>
+              <a:t>envFilePath</a:t>
+            </a:r>
+            <a:endParaRPr lang="en-US" sz="1900" dirty="0">
+              <a:latin typeface="Consolas" panose="020B0609020204030204" pitchFamily="49" charset="0"/>
+            </a:endParaRPr>
+          </a:p>
+          <a:p>
+            <a:pPr lvl="2"/>
+            <a:r>
+              <a:rPr lang="en-US" dirty="0"/>
+              <a:t>But, how to disable loading from .env file completely?</a:t>
+            </a:r>
+          </a:p>
+          <a:p>
+            <a:pPr lvl="1">
+              <a:lnSpc>
+                <a:spcPct val="80000"/>
+              </a:lnSpc>
+            </a:pPr>
+            <a:r>
+              <a:rPr lang="en-US" sz="1900" dirty="0" err="1">
+                <a:latin typeface="Consolas" panose="020B0609020204030204" pitchFamily="49" charset="0"/>
+              </a:rPr>
+              <a:t>ignoreEnvFile</a:t>
+            </a:r>
+            <a:r>
+              <a:rPr lang="en-US" sz="1900" dirty="0">
+                <a:latin typeface="Consolas" panose="020B0609020204030204" pitchFamily="49" charset="0"/>
+              </a:rPr>
+              <a:t>: true</a:t>
+            </a:r>
+          </a:p>
+          <a:p>
+            <a:pPr lvl="3"/>
+            <a:r>
+              <a:rPr lang="en-US" dirty="0"/>
+              <a:t>What is the benefit?</a:t>
+            </a:r>
+          </a:p>
+          <a:p>
+            <a:pPr lvl="4"/>
+            <a:r>
+              <a:rPr lang="en-US" dirty="0"/>
+              <a:t>When you load your environments from OS shell exports.</a:t>
+            </a:r>
+          </a:p>
+        </p:txBody>
+      </p:sp>
+      <p:sp>
+        <p:nvSpPr>
+          <p:cNvPr id="4" name="Footer Placeholder 3">
+            <a:extLst>
+              <a:ext uri="{FF2B5EF4-FFF2-40B4-BE49-F238E27FC236}">
+                <a16:creationId xmlns:a16="http://schemas.microsoft.com/office/drawing/2014/main" id="{C0B70010-A792-4B28-93D2-89709D279BBF}"/>
+              </a:ext>
+            </a:extLst>
+          </p:cNvPr>
+          <p:cNvSpPr>
+            <a:spLocks noGrp="1"/>
+          </p:cNvSpPr>
+          <p:nvPr>
+            <p:ph type="ftr" sz="quarter" idx="11"/>
+          </p:nvPr>
+        </p:nvSpPr>
+        <p:spPr/>
+        <p:txBody>
+          <a:bodyPr/>
+          <a:lstStyle/>
+          <a:p>
+            <a:r>
+              <a:rPr lang="en-US"/>
+              <a:t>Nodejs Basics</a:t>
+            </a:r>
+            <a:endParaRPr lang="en-US" dirty="0"/>
+          </a:p>
+        </p:txBody>
+      </p:sp>
+      <p:sp>
+        <p:nvSpPr>
+          <p:cNvPr id="5" name="Slide Number Placeholder 4">
+            <a:extLst>
+              <a:ext uri="{FF2B5EF4-FFF2-40B4-BE49-F238E27FC236}">
+                <a16:creationId xmlns:a16="http://schemas.microsoft.com/office/drawing/2014/main" id="{C4376DDF-2162-43D2-B52A-4EB25A22BDC5}"/>
+              </a:ext>
+            </a:extLst>
+          </p:cNvPr>
+          <p:cNvSpPr>
+            <a:spLocks noGrp="1"/>
+          </p:cNvSpPr>
+          <p:nvPr>
+            <p:ph type="sldNum" sz="quarter" idx="12"/>
+          </p:nvPr>
+        </p:nvSpPr>
+        <p:spPr/>
+        <p:txBody>
+          <a:bodyPr/>
+          <a:lstStyle/>
+          <a:p>
+            <a:fld id="{3A98EE3D-8CD1-4C3F-BD1C-C98C9596463C}" type="slidenum">
+              <a:rPr lang="en-US" smtClean="0"/>
+              <a:t>11</a:t>
+            </a:fld>
+            <a:endParaRPr lang="en-US" dirty="0"/>
+          </a:p>
+        </p:txBody>
+      </p:sp>
+    </p:spTree>
+    <p:extLst>
+      <p:ext uri="{BB962C8B-B14F-4D97-AF65-F5344CB8AC3E}">
+        <p14:creationId xmlns:p14="http://schemas.microsoft.com/office/powerpoint/2010/main" val="3569709037"/>
+      </p:ext>
+    </p:extLst>
+  </p:cSld>
+  <p:clrMapOvr>
+    <a:masterClrMapping/>
+  </p:clrMapOvr>
+</p:sld>
+</file>
+
+<file path=ppt/slides/slide12.xml><?xml version="1.0" encoding="utf-8"?>
+<p:sld xmlns:a="http://schemas.openxmlformats.org/drawingml/2006/main" xmlns:r="http://schemas.openxmlformats.org/officeDocument/2006/relationships" xmlns:p="http://schemas.openxmlformats.org/presentationml/2006/main">
+  <p:cSld>
+    <p:spTree>
+      <p:nvGrpSpPr>
+        <p:cNvPr id="1" name=""/>
+        <p:cNvGrpSpPr/>
+        <p:nvPr/>
+      </p:nvGrpSpPr>
+      <p:grpSpPr>
+        <a:xfrm>
+          <a:off x="0" y="0"/>
+          <a:ext cx="0" cy="0"/>
+          <a:chOff x="0" y="0"/>
+          <a:chExt cx="0" cy="0"/>
+        </a:xfrm>
+      </p:grpSpPr>
+      <p:sp>
+        <p:nvSpPr>
+          <p:cNvPr id="2" name="Title 1">
+            <a:extLst>
+              <a:ext uri="{FF2B5EF4-FFF2-40B4-BE49-F238E27FC236}">
+                <a16:creationId xmlns:a16="http://schemas.microsoft.com/office/drawing/2014/main" id="{194BABF8-2799-4381-B39B-18E4E56173D1}"/>
+              </a:ext>
+            </a:extLst>
+          </p:cNvPr>
+          <p:cNvSpPr>
+            <a:spLocks noGrp="1"/>
+          </p:cNvSpPr>
+          <p:nvPr>
+            <p:ph type="title"/>
+          </p:nvPr>
+        </p:nvSpPr>
+        <p:spPr/>
+        <p:txBody>
+          <a:bodyPr/>
+          <a:lstStyle/>
+          <a:p>
+            <a:r>
+              <a:rPr lang="en-US" dirty="0"/>
+              <a:t>Demo</a:t>
+            </a:r>
+          </a:p>
+        </p:txBody>
+      </p:sp>
+      <p:sp>
+        <p:nvSpPr>
+          <p:cNvPr id="3" name="Content Placeholder 2">
+            <a:extLst>
+              <a:ext uri="{FF2B5EF4-FFF2-40B4-BE49-F238E27FC236}">
+                <a16:creationId xmlns:a16="http://schemas.microsoft.com/office/drawing/2014/main" id="{F57B8C11-C047-49E6-B30B-A724CB20B782}"/>
+              </a:ext>
+            </a:extLst>
+          </p:cNvPr>
+          <p:cNvSpPr>
+            <a:spLocks noGrp="1"/>
+          </p:cNvSpPr>
+          <p:nvPr>
+            <p:ph idx="1"/>
+          </p:nvPr>
+        </p:nvSpPr>
+        <p:spPr/>
+        <p:txBody>
+          <a:bodyPr>
+            <a:normAutofit lnSpcReduction="10000"/>
+          </a:bodyPr>
+          <a:lstStyle/>
+          <a:p>
+            <a:r>
+              <a:rPr lang="en-US" dirty="0"/>
+              <a:t>Schema validation (for our configs)</a:t>
+            </a:r>
+          </a:p>
+          <a:p>
+            <a:pPr lvl="1"/>
+            <a:r>
+              <a:rPr lang="en-US" dirty="0"/>
+              <a:t>It is best practice to throw error while bootstrapping if configs are wrong syntactically (or not provided)</a:t>
+            </a:r>
+          </a:p>
+          <a:p>
+            <a:pPr lvl="2"/>
+            <a:r>
+              <a:rPr lang="en-US" dirty="0"/>
+              <a:t>Here it comes </a:t>
+            </a:r>
+            <a:r>
+              <a:rPr lang="en-US" sz="1900" dirty="0">
+                <a:latin typeface="Consolas" panose="020B0609020204030204" pitchFamily="49" charset="0"/>
+              </a:rPr>
+              <a:t>joi</a:t>
+            </a:r>
+            <a:r>
+              <a:rPr lang="en-US" dirty="0"/>
+              <a:t> </a:t>
+            </a:r>
+            <a:r>
+              <a:rPr lang="en-US" dirty="0">
+                <a:sym typeface="Wingdings" panose="05000000000000000000" pitchFamily="2" charset="2"/>
+              </a:rPr>
+              <a:t></a:t>
+            </a:r>
+          </a:p>
+          <a:p>
+            <a:pPr lvl="3"/>
+            <a:r>
+              <a:rPr lang="en-US" dirty="0">
+                <a:sym typeface="Wingdings" panose="05000000000000000000" pitchFamily="2" charset="2"/>
+              </a:rPr>
+              <a:t>In </a:t>
+            </a:r>
+            <a:r>
+              <a:rPr lang="en-US" sz="1900" dirty="0">
+                <a:latin typeface="Consolas" panose="020B0609020204030204" pitchFamily="49" charset="0"/>
+                <a:sym typeface="Wingdings" panose="05000000000000000000" pitchFamily="2" charset="2"/>
+              </a:rPr>
+              <a:t>joi</a:t>
+            </a:r>
+            <a:r>
+              <a:rPr lang="en-US" dirty="0">
+                <a:sym typeface="Wingdings" panose="05000000000000000000" pitchFamily="2" charset="2"/>
+              </a:rPr>
+              <a:t> you can define schema and validate js objects against it.</a:t>
+            </a:r>
+          </a:p>
+          <a:p>
+            <a:pPr lvl="3">
+              <a:lnSpc>
+                <a:spcPct val="90000"/>
+              </a:lnSpc>
+            </a:pPr>
+            <a:r>
+              <a:rPr lang="en-US" sz="1400" dirty="0" err="1">
+                <a:latin typeface="Consolas" panose="020B0609020204030204" pitchFamily="49" charset="0"/>
+                <a:sym typeface="Wingdings" panose="05000000000000000000" pitchFamily="2" charset="2"/>
+              </a:rPr>
+              <a:t>npm</a:t>
+            </a:r>
+            <a:r>
+              <a:rPr lang="en-US" sz="1400" dirty="0">
+                <a:latin typeface="Consolas" panose="020B0609020204030204" pitchFamily="49" charset="0"/>
+                <a:sym typeface="Wingdings" panose="05000000000000000000" pitchFamily="2" charset="2"/>
+              </a:rPr>
+              <a:t> install joi</a:t>
+            </a:r>
+          </a:p>
+          <a:p>
+            <a:r>
+              <a:rPr lang="en-US" dirty="0">
+                <a:sym typeface="Wingdings" panose="05000000000000000000" pitchFamily="2" charset="2"/>
+              </a:rPr>
+              <a:t>How to use </a:t>
+            </a:r>
+            <a:r>
+              <a:rPr lang="en-US" sz="1900" dirty="0" err="1">
+                <a:latin typeface="Consolas" panose="020B0609020204030204" pitchFamily="49" charset="0"/>
+                <a:sym typeface="Wingdings" panose="05000000000000000000" pitchFamily="2" charset="2"/>
+              </a:rPr>
+              <a:t>ConfigModule</a:t>
+            </a:r>
+            <a:r>
+              <a:rPr lang="en-US" dirty="0">
+                <a:sym typeface="Wingdings" panose="05000000000000000000" pitchFamily="2" charset="2"/>
+              </a:rPr>
+              <a:t> (and its service) inside other modules?</a:t>
+            </a:r>
+          </a:p>
+          <a:p>
+            <a:pPr lvl="1"/>
+            <a:r>
+              <a:rPr lang="en-US" dirty="0">
+                <a:sym typeface="Wingdings" panose="05000000000000000000" pitchFamily="2" charset="2"/>
+              </a:rPr>
+              <a:t>Just import it</a:t>
+            </a:r>
+          </a:p>
+          <a:p>
+            <a:pPr lvl="2"/>
+            <a:r>
+              <a:rPr lang="en-US" dirty="0">
+                <a:sym typeface="Wingdings" panose="05000000000000000000" pitchFamily="2" charset="2"/>
+              </a:rPr>
+              <a:t>Remember to always use </a:t>
+            </a:r>
+            <a:r>
+              <a:rPr lang="en-US" sz="1900" dirty="0">
+                <a:latin typeface="Consolas" panose="020B0609020204030204" pitchFamily="49" charset="0"/>
+                <a:sym typeface="Wingdings" panose="05000000000000000000" pitchFamily="2" charset="2"/>
+              </a:rPr>
+              <a:t>.forRoot </a:t>
+            </a:r>
+            <a:r>
+              <a:rPr lang="en-US" dirty="0">
+                <a:sym typeface="Wingdings" panose="05000000000000000000" pitchFamily="2" charset="2"/>
+              </a:rPr>
+              <a:t>once (inside </a:t>
+            </a:r>
+            <a:r>
+              <a:rPr lang="en-US" sz="1900" dirty="0">
+                <a:latin typeface="Consolas" panose="020B0609020204030204" pitchFamily="49" charset="0"/>
+                <a:sym typeface="Wingdings" panose="05000000000000000000" pitchFamily="2" charset="2"/>
+              </a:rPr>
+              <a:t>AppModule</a:t>
+            </a:r>
+            <a:r>
+              <a:rPr lang="en-US" dirty="0">
+                <a:sym typeface="Wingdings" panose="05000000000000000000" pitchFamily="2" charset="2"/>
+              </a:rPr>
+              <a:t>)</a:t>
+            </a:r>
+          </a:p>
+          <a:p>
+            <a:pPr lvl="2"/>
+            <a:r>
+              <a:rPr lang="en-US" dirty="0"/>
+              <a:t>Config service has get method to return value of an environment variable</a:t>
+            </a:r>
+          </a:p>
+          <a:p>
+            <a:pPr lvl="3"/>
+            <a:r>
+              <a:rPr lang="en-US" dirty="0"/>
+              <a:t>It has default value as the second argument</a:t>
+            </a:r>
+          </a:p>
+          <a:p>
+            <a:pPr lvl="1"/>
+            <a:endParaRPr lang="en-US" dirty="0"/>
+          </a:p>
+        </p:txBody>
+      </p:sp>
+      <p:sp>
+        <p:nvSpPr>
+          <p:cNvPr id="4" name="Footer Placeholder 3">
+            <a:extLst>
+              <a:ext uri="{FF2B5EF4-FFF2-40B4-BE49-F238E27FC236}">
+                <a16:creationId xmlns:a16="http://schemas.microsoft.com/office/drawing/2014/main" id="{5AF27F9F-C338-45F0-AAFB-8F001248D74D}"/>
+              </a:ext>
+            </a:extLst>
+          </p:cNvPr>
+          <p:cNvSpPr>
+            <a:spLocks noGrp="1"/>
+          </p:cNvSpPr>
+          <p:nvPr>
+            <p:ph type="ftr" sz="quarter" idx="11"/>
+          </p:nvPr>
+        </p:nvSpPr>
+        <p:spPr/>
+        <p:txBody>
+          <a:bodyPr/>
+          <a:lstStyle/>
+          <a:p>
+            <a:r>
+              <a:rPr lang="en-US"/>
+              <a:t>Nodejs Basics</a:t>
+            </a:r>
+            <a:endParaRPr lang="en-US" dirty="0"/>
+          </a:p>
+        </p:txBody>
+      </p:sp>
+      <p:sp>
+        <p:nvSpPr>
+          <p:cNvPr id="5" name="Slide Number Placeholder 4">
+            <a:extLst>
+              <a:ext uri="{FF2B5EF4-FFF2-40B4-BE49-F238E27FC236}">
+                <a16:creationId xmlns:a16="http://schemas.microsoft.com/office/drawing/2014/main" id="{E89B50E2-BDA4-439A-9EED-D0CEA20822BF}"/>
+              </a:ext>
+            </a:extLst>
+          </p:cNvPr>
+          <p:cNvSpPr>
+            <a:spLocks noGrp="1"/>
+          </p:cNvSpPr>
+          <p:nvPr>
+            <p:ph type="sldNum" sz="quarter" idx="12"/>
+          </p:nvPr>
+        </p:nvSpPr>
+        <p:spPr/>
+        <p:txBody>
+          <a:bodyPr/>
+          <a:lstStyle/>
+          <a:p>
+            <a:fld id="{3A98EE3D-8CD1-4C3F-BD1C-C98C9596463C}" type="slidenum">
+              <a:rPr lang="en-US" smtClean="0"/>
+              <a:t>12</a:t>
+            </a:fld>
+            <a:endParaRPr lang="en-US" dirty="0"/>
+          </a:p>
+        </p:txBody>
+      </p:sp>
+    </p:spTree>
+    <p:extLst>
+      <p:ext uri="{BB962C8B-B14F-4D97-AF65-F5344CB8AC3E}">
+        <p14:creationId xmlns:p14="http://schemas.microsoft.com/office/powerpoint/2010/main" val="656203859"/>
+      </p:ext>
+    </p:extLst>
+  </p:cSld>
+  <p:clrMapOvr>
+    <a:masterClrMapping/>
+  </p:clrMapOvr>
+</p:sld>
+</file>
+
+<file path=ppt/slides/slide13.xml><?xml version="1.0" encoding="utf-8"?>
+<p:sld xmlns:a="http://schemas.openxmlformats.org/drawingml/2006/main" xmlns:r="http://schemas.openxmlformats.org/officeDocument/2006/relationships" xmlns:p="http://schemas.openxmlformats.org/presentationml/2006/main">
+  <p:cSld>
+    <p:spTree>
+      <p:nvGrpSpPr>
+        <p:cNvPr id="1" name=""/>
+        <p:cNvGrpSpPr/>
+        <p:nvPr/>
+      </p:nvGrpSpPr>
+      <p:grpSpPr>
+        <a:xfrm>
+          <a:off x="0" y="0"/>
+          <a:ext cx="0" cy="0"/>
+          <a:chOff x="0" y="0"/>
+          <a:chExt cx="0" cy="0"/>
+        </a:xfrm>
+      </p:grpSpPr>
+      <p:sp>
+        <p:nvSpPr>
+          <p:cNvPr id="2" name="Title 1">
+            <a:extLst>
+              <a:ext uri="{FF2B5EF4-FFF2-40B4-BE49-F238E27FC236}">
+                <a16:creationId xmlns:a16="http://schemas.microsoft.com/office/drawing/2014/main" id="{D90D3360-64E5-42A4-B8E4-AF56ACB75263}"/>
+              </a:ext>
+            </a:extLst>
+          </p:cNvPr>
+          <p:cNvSpPr>
+            <a:spLocks noGrp="1"/>
+          </p:cNvSpPr>
+          <p:nvPr>
+            <p:ph type="title"/>
+          </p:nvPr>
+        </p:nvSpPr>
+        <p:spPr/>
+        <p:txBody>
+          <a:bodyPr/>
+          <a:lstStyle/>
+          <a:p>
+            <a:r>
+              <a:rPr lang="en-US" dirty="0"/>
+              <a:t>Demo</a:t>
+            </a:r>
+          </a:p>
+        </p:txBody>
+      </p:sp>
+      <p:sp>
+        <p:nvSpPr>
+          <p:cNvPr id="3" name="Content Placeholder 2">
+            <a:extLst>
+              <a:ext uri="{FF2B5EF4-FFF2-40B4-BE49-F238E27FC236}">
+                <a16:creationId xmlns:a16="http://schemas.microsoft.com/office/drawing/2014/main" id="{07E01EB6-18DB-4405-9A71-699B8E4E811E}"/>
+              </a:ext>
+            </a:extLst>
+          </p:cNvPr>
+          <p:cNvSpPr>
+            <a:spLocks noGrp="1"/>
+          </p:cNvSpPr>
+          <p:nvPr>
+            <p:ph idx="1"/>
+          </p:nvPr>
+        </p:nvSpPr>
+        <p:spPr/>
+        <p:txBody>
+          <a:bodyPr/>
+          <a:lstStyle/>
+          <a:p>
+            <a:r>
+              <a:rPr lang="en-US" dirty="0"/>
+              <a:t>What about big projects with a lot configurations</a:t>
+            </a:r>
+          </a:p>
+          <a:p>
+            <a:pPr lvl="1"/>
+            <a:r>
+              <a:rPr lang="en-US" dirty="0"/>
+              <a:t>Add </a:t>
+            </a:r>
+            <a:r>
+              <a:rPr lang="en-US"/>
+              <a:t>namespaces and </a:t>
+            </a:r>
+            <a:r>
+              <a:rPr lang="en-US" dirty="0"/>
+              <a:t>finally use Partial registration (</a:t>
+            </a:r>
+            <a:r>
+              <a:rPr lang="en-US" dirty="0">
+                <a:latin typeface="Consolas" panose="020B0609020204030204" pitchFamily="49" charset="0"/>
+              </a:rPr>
+              <a:t>.</a:t>
+            </a:r>
+            <a:r>
+              <a:rPr lang="en-US" dirty="0" err="1">
+                <a:latin typeface="Consolas" panose="020B0609020204030204" pitchFamily="49" charset="0"/>
+              </a:rPr>
+              <a:t>forFeature</a:t>
+            </a:r>
+            <a:r>
+              <a:rPr lang="en-US" dirty="0"/>
+              <a:t>)</a:t>
+            </a:r>
+          </a:p>
+          <a:p>
+            <a:pPr lvl="2"/>
+            <a:r>
+              <a:rPr lang="en-US" dirty="0"/>
+              <a:t>It allows you to register configs closer to their modules (rather than load each of them inside root module with </a:t>
+            </a:r>
+            <a:r>
+              <a:rPr lang="en-US" sz="2100" dirty="0">
+                <a:latin typeface="Consolas" panose="020B0609020204030204" pitchFamily="49" charset="0"/>
+              </a:rPr>
+              <a:t>.forRoot</a:t>
+            </a:r>
+            <a:r>
+              <a:rPr lang="en-US" dirty="0"/>
+              <a:t>)</a:t>
+            </a:r>
+          </a:p>
+          <a:p>
+            <a:r>
+              <a:rPr lang="en-US" dirty="0"/>
+              <a:t>How to not use string notation</a:t>
+            </a:r>
+          </a:p>
+          <a:p>
+            <a:pPr lvl="1"/>
+            <a:r>
+              <a:rPr lang="en-US" dirty="0"/>
+              <a:t>Use </a:t>
+            </a:r>
+          </a:p>
+          <a:p>
+            <a:pPr lvl="2"/>
+            <a:r>
+              <a:rPr lang="en-US" dirty="0">
+                <a:latin typeface="Consolas" panose="020B0609020204030204" pitchFamily="49" charset="0"/>
+              </a:rPr>
+              <a:t>@Inject(namespace.KEY) </a:t>
+            </a:r>
+          </a:p>
+          <a:p>
+            <a:pPr lvl="2"/>
+            <a:r>
+              <a:rPr lang="en-US" dirty="0">
+                <a:latin typeface="Consolas" panose="020B0609020204030204" pitchFamily="49" charset="0"/>
+              </a:rPr>
+              <a:t>private </a:t>
+            </a:r>
+            <a:r>
+              <a:rPr lang="en-US" dirty="0" err="1">
+                <a:latin typeface="Consolas" panose="020B0609020204030204" pitchFamily="49" charset="0"/>
+              </a:rPr>
+              <a:t>readonly</a:t>
+            </a:r>
+            <a:r>
+              <a:rPr lang="en-US" dirty="0">
+                <a:latin typeface="Consolas" panose="020B0609020204030204" pitchFamily="49" charset="0"/>
+              </a:rPr>
+              <a:t> config: </a:t>
+            </a:r>
+            <a:r>
+              <a:rPr lang="en-US" dirty="0" err="1">
+                <a:latin typeface="Consolas" panose="020B0609020204030204" pitchFamily="49" charset="0"/>
+              </a:rPr>
+              <a:t>ConfigType</a:t>
+            </a:r>
+            <a:r>
+              <a:rPr lang="en-US" dirty="0">
+                <a:latin typeface="Consolas" panose="020B0609020204030204" pitchFamily="49" charset="0"/>
+              </a:rPr>
+              <a:t>&lt;</a:t>
+            </a:r>
+            <a:r>
+              <a:rPr lang="en-US" dirty="0" err="1">
+                <a:latin typeface="Consolas" panose="020B0609020204030204" pitchFamily="49" charset="0"/>
+              </a:rPr>
+              <a:t>typeof</a:t>
+            </a:r>
+            <a:r>
+              <a:rPr lang="en-US" dirty="0">
+                <a:latin typeface="Consolas" panose="020B0609020204030204" pitchFamily="49" charset="0"/>
+              </a:rPr>
+              <a:t> namespace&gt;</a:t>
+            </a:r>
+          </a:p>
+          <a:p>
+            <a:pPr lvl="1"/>
+            <a:endParaRPr lang="en-US" dirty="0"/>
+          </a:p>
+        </p:txBody>
+      </p:sp>
+      <p:sp>
+        <p:nvSpPr>
+          <p:cNvPr id="4" name="Footer Placeholder 3">
+            <a:extLst>
+              <a:ext uri="{FF2B5EF4-FFF2-40B4-BE49-F238E27FC236}">
+                <a16:creationId xmlns:a16="http://schemas.microsoft.com/office/drawing/2014/main" id="{BE95CA09-EF7A-4870-A190-D49D1536ABBF}"/>
+              </a:ext>
+            </a:extLst>
+          </p:cNvPr>
+          <p:cNvSpPr>
+            <a:spLocks noGrp="1"/>
+          </p:cNvSpPr>
+          <p:nvPr>
+            <p:ph type="ftr" sz="quarter" idx="11"/>
+          </p:nvPr>
+        </p:nvSpPr>
+        <p:spPr/>
+        <p:txBody>
+          <a:bodyPr/>
+          <a:lstStyle/>
+          <a:p>
+            <a:r>
+              <a:rPr lang="en-US"/>
+              <a:t>Nodejs Basics</a:t>
+            </a:r>
+            <a:endParaRPr lang="en-US" dirty="0"/>
+          </a:p>
+        </p:txBody>
+      </p:sp>
+      <p:sp>
+        <p:nvSpPr>
+          <p:cNvPr id="5" name="Slide Number Placeholder 4">
+            <a:extLst>
+              <a:ext uri="{FF2B5EF4-FFF2-40B4-BE49-F238E27FC236}">
+                <a16:creationId xmlns:a16="http://schemas.microsoft.com/office/drawing/2014/main" id="{F260E0F4-6EAA-4F22-822B-5C25099EB053}"/>
+              </a:ext>
+            </a:extLst>
+          </p:cNvPr>
+          <p:cNvSpPr>
+            <a:spLocks noGrp="1"/>
+          </p:cNvSpPr>
+          <p:nvPr>
+            <p:ph type="sldNum" sz="quarter" idx="12"/>
+          </p:nvPr>
+        </p:nvSpPr>
+        <p:spPr/>
+        <p:txBody>
+          <a:bodyPr/>
+          <a:lstStyle/>
+          <a:p>
+            <a:fld id="{3A98EE3D-8CD1-4C3F-BD1C-C98C9596463C}" type="slidenum">
+              <a:rPr lang="en-US" smtClean="0"/>
+              <a:t>13</a:t>
+            </a:fld>
+            <a:endParaRPr lang="en-US" dirty="0"/>
+          </a:p>
+        </p:txBody>
+      </p:sp>
+    </p:spTree>
+    <p:extLst>
+      <p:ext uri="{BB962C8B-B14F-4D97-AF65-F5344CB8AC3E}">
+        <p14:creationId xmlns:p14="http://schemas.microsoft.com/office/powerpoint/2010/main" val="1444485887"/>
+      </p:ext>
+    </p:extLst>
+  </p:cSld>
+  <p:clrMapOvr>
+    <a:masterClrMapping/>
+  </p:clrMapOvr>
+</p:sld>
+</file>
+
+<file path=ppt/slides/slide14.xml><?xml version="1.0" encoding="utf-8"?>
+<p:sld xmlns:a="http://schemas.openxmlformats.org/drawingml/2006/main" xmlns:r="http://schemas.openxmlformats.org/officeDocument/2006/relationships" xmlns:p="http://schemas.openxmlformats.org/presentationml/2006/main">
+  <p:cSld>
+    <p:spTree>
+      <p:nvGrpSpPr>
+        <p:cNvPr id="1" name=""/>
+        <p:cNvGrpSpPr/>
+        <p:nvPr/>
+      </p:nvGrpSpPr>
+      <p:grpSpPr>
+        <a:xfrm>
+          <a:off x="0" y="0"/>
+          <a:ext cx="0" cy="0"/>
+          <a:chOff x="0" y="0"/>
+          <a:chExt cx="0" cy="0"/>
+        </a:xfrm>
+      </p:grpSpPr>
+      <p:sp>
+        <p:nvSpPr>
+          <p:cNvPr id="2" name="Title 1">
+            <a:extLst>
+              <a:ext uri="{FF2B5EF4-FFF2-40B4-BE49-F238E27FC236}">
+                <a16:creationId xmlns:a16="http://schemas.microsoft.com/office/drawing/2014/main" id="{9783581F-0D80-4F54-B5BC-00166159EB9C}"/>
+              </a:ext>
+            </a:extLst>
+          </p:cNvPr>
+          <p:cNvSpPr>
+            <a:spLocks noGrp="1"/>
+          </p:cNvSpPr>
+          <p:nvPr>
+            <p:ph type="title"/>
+          </p:nvPr>
+        </p:nvSpPr>
+        <p:spPr/>
+        <p:txBody>
+          <a:bodyPr/>
+          <a:lstStyle/>
+          <a:p>
+            <a:r>
+              <a:rPr lang="en-US" dirty="0"/>
+              <a:t>Demo</a:t>
+            </a:r>
+          </a:p>
+        </p:txBody>
+      </p:sp>
+      <p:sp>
+        <p:nvSpPr>
+          <p:cNvPr id="3" name="Content Placeholder 2">
+            <a:extLst>
+              <a:ext uri="{FF2B5EF4-FFF2-40B4-BE49-F238E27FC236}">
+                <a16:creationId xmlns:a16="http://schemas.microsoft.com/office/drawing/2014/main" id="{2DC5242A-098C-4DA6-9DAE-5F982DD98F52}"/>
+              </a:ext>
+            </a:extLst>
+          </p:cNvPr>
+          <p:cNvSpPr>
+            <a:spLocks noGrp="1"/>
+          </p:cNvSpPr>
+          <p:nvPr>
+            <p:ph idx="1"/>
+          </p:nvPr>
+        </p:nvSpPr>
+        <p:spPr/>
+        <p:txBody>
+          <a:bodyPr/>
+          <a:lstStyle/>
+          <a:p>
+            <a:r>
+              <a:rPr lang="en-US" dirty="0"/>
+              <a:t>Asynchronously configure dynamic modules</a:t>
+            </a:r>
+          </a:p>
+          <a:p>
+            <a:pPr lvl="1"/>
+            <a:r>
+              <a:rPr lang="en-US" dirty="0"/>
+              <a:t>Remember that module import order are vital for </a:t>
+            </a:r>
+            <a:r>
+              <a:rPr lang="en-US" dirty="0" err="1">
+                <a:latin typeface="Consolas" panose="020B0609020204030204" pitchFamily="49" charset="0"/>
+              </a:rPr>
+              <a:t>process.env</a:t>
+            </a:r>
+            <a:r>
+              <a:rPr lang="en-US" dirty="0">
+                <a:latin typeface="Consolas" panose="020B0609020204030204" pitchFamily="49" charset="0"/>
+              </a:rPr>
+              <a:t> </a:t>
+            </a:r>
+            <a:r>
+              <a:rPr lang="en-US" dirty="0">
+                <a:sym typeface="Wingdings" panose="05000000000000000000" pitchFamily="2" charset="2"/>
+              </a:rPr>
+              <a:t></a:t>
+            </a:r>
+          </a:p>
+          <a:p>
+            <a:pPr lvl="2"/>
+            <a:r>
+              <a:rPr lang="en-US" dirty="0">
+                <a:sym typeface="Wingdings" panose="05000000000000000000" pitchFamily="2" charset="2"/>
+              </a:rPr>
+              <a:t>Here it comes async providers, they are loaded after all other providers are resolved (</a:t>
+            </a:r>
+            <a:r>
+              <a:rPr lang="en-US" sz="2100" dirty="0">
+                <a:latin typeface="Consolas" panose="020B0609020204030204" pitchFamily="49" charset="0"/>
+                <a:sym typeface="Wingdings" panose="05000000000000000000" pitchFamily="2" charset="2"/>
+              </a:rPr>
+              <a:t>.forRootAsync</a:t>
+            </a:r>
+            <a:r>
+              <a:rPr lang="en-US" dirty="0">
+                <a:sym typeface="Wingdings" panose="05000000000000000000" pitchFamily="2" charset="2"/>
+              </a:rPr>
+              <a:t>), every general purpose module should has this type of dynamic module.</a:t>
+            </a:r>
+            <a:endParaRPr lang="en-US" dirty="0"/>
+          </a:p>
+          <a:p>
+            <a:pPr lvl="1"/>
+            <a:r>
+              <a:rPr lang="en-US" dirty="0"/>
+              <a:t>What happens if we don’t want to use </a:t>
+            </a:r>
+            <a:r>
+              <a:rPr lang="en-US" dirty="0" err="1">
+                <a:latin typeface="Consolas" panose="020B0609020204030204" pitchFamily="49" charset="0"/>
+              </a:rPr>
+              <a:t>process.env</a:t>
+            </a:r>
+            <a:r>
+              <a:rPr lang="en-US" dirty="0"/>
+              <a:t> inside the </a:t>
+            </a:r>
+            <a:r>
+              <a:rPr lang="en-US" dirty="0" err="1">
+                <a:latin typeface="Consolas" panose="020B0609020204030204" pitchFamily="49" charset="0"/>
+              </a:rPr>
+              <a:t>TypeormModule</a:t>
+            </a:r>
+            <a:r>
+              <a:rPr lang="en-US" dirty="0"/>
+              <a:t> (as an example?)</a:t>
+            </a:r>
+          </a:p>
+          <a:p>
+            <a:pPr lvl="2"/>
+            <a:r>
+              <a:rPr lang="en-US" dirty="0"/>
+              <a:t>Here it comes </a:t>
+            </a:r>
+            <a:r>
+              <a:rPr lang="en-US" sz="2100" dirty="0">
+                <a:latin typeface="Consolas" panose="020B0609020204030204" pitchFamily="49" charset="0"/>
+              </a:rPr>
+              <a:t>useFactory</a:t>
+            </a:r>
+            <a:r>
+              <a:rPr lang="en-US" dirty="0"/>
+              <a:t> </a:t>
+            </a:r>
+            <a:r>
+              <a:rPr lang="en-US" dirty="0">
+                <a:sym typeface="Wingdings" panose="05000000000000000000" pitchFamily="2" charset="2"/>
+              </a:rPr>
+              <a:t></a:t>
+            </a:r>
+          </a:p>
+          <a:p>
+            <a:pPr lvl="3"/>
+            <a:r>
+              <a:rPr lang="en-US" dirty="0">
+                <a:sym typeface="Wingdings" panose="05000000000000000000" pitchFamily="2" charset="2"/>
+              </a:rPr>
+              <a:t>Every module has async dynamic module that helps us to inject </a:t>
+            </a:r>
+            <a:r>
+              <a:rPr lang="en-US" sz="2100" dirty="0" err="1">
+                <a:latin typeface="Consolas" panose="020B0609020204030204" pitchFamily="49" charset="0"/>
+                <a:sym typeface="Wingdings" panose="05000000000000000000" pitchFamily="2" charset="2"/>
+              </a:rPr>
+              <a:t>ConfigService</a:t>
+            </a:r>
+            <a:r>
+              <a:rPr lang="en-US" dirty="0">
+                <a:sym typeface="Wingdings" panose="05000000000000000000" pitchFamily="2" charset="2"/>
+              </a:rPr>
+              <a:t> inside that module as a dependency</a:t>
+            </a:r>
+          </a:p>
+          <a:p>
+            <a:pPr marL="450000" lvl="1" indent="0">
+              <a:buNone/>
+            </a:pPr>
+            <a:endParaRPr lang="en-US" dirty="0"/>
+          </a:p>
+        </p:txBody>
+      </p:sp>
+      <p:sp>
+        <p:nvSpPr>
+          <p:cNvPr id="4" name="Footer Placeholder 3">
+            <a:extLst>
+              <a:ext uri="{FF2B5EF4-FFF2-40B4-BE49-F238E27FC236}">
+                <a16:creationId xmlns:a16="http://schemas.microsoft.com/office/drawing/2014/main" id="{16322FF4-3BE4-4C2D-AD03-3F3C021C3479}"/>
+              </a:ext>
+            </a:extLst>
+          </p:cNvPr>
+          <p:cNvSpPr>
+            <a:spLocks noGrp="1"/>
+          </p:cNvSpPr>
+          <p:nvPr>
+            <p:ph type="ftr" sz="quarter" idx="11"/>
+          </p:nvPr>
+        </p:nvSpPr>
+        <p:spPr/>
+        <p:txBody>
+          <a:bodyPr/>
+          <a:lstStyle/>
+          <a:p>
+            <a:r>
+              <a:rPr lang="en-US"/>
+              <a:t>Nodejs Basics</a:t>
+            </a:r>
+            <a:endParaRPr lang="en-US" dirty="0"/>
+          </a:p>
+        </p:txBody>
+      </p:sp>
+      <p:sp>
+        <p:nvSpPr>
+          <p:cNvPr id="5" name="Slide Number Placeholder 4">
+            <a:extLst>
+              <a:ext uri="{FF2B5EF4-FFF2-40B4-BE49-F238E27FC236}">
+                <a16:creationId xmlns:a16="http://schemas.microsoft.com/office/drawing/2014/main" id="{00011E22-1C08-4697-AA7A-C5855B1B2C1D}"/>
+              </a:ext>
+            </a:extLst>
+          </p:cNvPr>
+          <p:cNvSpPr>
+            <a:spLocks noGrp="1"/>
+          </p:cNvSpPr>
+          <p:nvPr>
+            <p:ph type="sldNum" sz="quarter" idx="12"/>
+          </p:nvPr>
+        </p:nvSpPr>
+        <p:spPr/>
+        <p:txBody>
+          <a:bodyPr/>
+          <a:lstStyle/>
+          <a:p>
+            <a:fld id="{3A98EE3D-8CD1-4C3F-BD1C-C98C9596463C}" type="slidenum">
+              <a:rPr lang="en-US" smtClean="0"/>
+              <a:t>14</a:t>
+            </a:fld>
+            <a:endParaRPr lang="en-US" dirty="0"/>
+          </a:p>
+        </p:txBody>
+      </p:sp>
+    </p:spTree>
+    <p:extLst>
+      <p:ext uri="{BB962C8B-B14F-4D97-AF65-F5344CB8AC3E}">
+        <p14:creationId xmlns:p14="http://schemas.microsoft.com/office/powerpoint/2010/main" val="3840590033"/>
+      </p:ext>
+    </p:extLst>
+  </p:cSld>
+  <p:clrMapOvr>
+    <a:masterClrMapping/>
+  </p:clrMapOvr>
+</p:sld>
+</file>
+
+<file path=ppt/slides/slide15.xml><?xml version="1.0" encoding="utf-8"?>
+<p:sld xmlns:a="http://schemas.openxmlformats.org/drawingml/2006/main" xmlns:r="http://schemas.openxmlformats.org/officeDocument/2006/relationships" xmlns:p="http://schemas.openxmlformats.org/presentationml/2006/main">
+  <p:cSld>
+    <p:spTree>
+      <p:nvGrpSpPr>
+        <p:cNvPr id="1" name=""/>
+        <p:cNvGrpSpPr/>
+        <p:nvPr/>
+      </p:nvGrpSpPr>
+      <p:grpSpPr>
+        <a:xfrm>
+          <a:off x="0" y="0"/>
+          <a:ext cx="0" cy="0"/>
+          <a:chOff x="0" y="0"/>
+          <a:chExt cx="0" cy="0"/>
+        </a:xfrm>
+      </p:grpSpPr>
+      <p:sp>
+        <p:nvSpPr>
+          <p:cNvPr id="2" name="Title 1">
+            <a:extLst>
+              <a:ext uri="{FF2B5EF4-FFF2-40B4-BE49-F238E27FC236}">
+                <a16:creationId xmlns:a16="http://schemas.microsoft.com/office/drawing/2014/main" id="{6B1A0672-14A7-4501-900C-A98EBCCF7AFE}"/>
+              </a:ext>
+            </a:extLst>
+          </p:cNvPr>
+          <p:cNvSpPr>
+            <a:spLocks noGrp="1"/>
+          </p:cNvSpPr>
+          <p:nvPr>
+            <p:ph type="title"/>
+          </p:nvPr>
+        </p:nvSpPr>
+        <p:spPr/>
+        <p:txBody>
+          <a:bodyPr/>
+          <a:lstStyle/>
+          <a:p>
+            <a:r>
+              <a:rPr lang="en-US" dirty="0"/>
+              <a:t>Exercise</a:t>
+            </a:r>
+          </a:p>
+        </p:txBody>
+      </p:sp>
+      <p:sp>
+        <p:nvSpPr>
+          <p:cNvPr id="3" name="Content Placeholder 2">
+            <a:extLst>
+              <a:ext uri="{FF2B5EF4-FFF2-40B4-BE49-F238E27FC236}">
+                <a16:creationId xmlns:a16="http://schemas.microsoft.com/office/drawing/2014/main" id="{2AEB1BE9-8435-42BF-A4F1-2F148FA9187A}"/>
+              </a:ext>
+            </a:extLst>
+          </p:cNvPr>
+          <p:cNvSpPr>
+            <a:spLocks noGrp="1"/>
+          </p:cNvSpPr>
+          <p:nvPr>
+            <p:ph idx="1"/>
+          </p:nvPr>
+        </p:nvSpPr>
+        <p:spPr/>
+        <p:txBody>
+          <a:bodyPr>
+            <a:normAutofit lnSpcReduction="10000"/>
+          </a:bodyPr>
+          <a:lstStyle/>
+          <a:p>
+            <a:r>
+              <a:rPr lang="en-US" dirty="0"/>
+              <a:t>Required:</a:t>
+            </a:r>
+          </a:p>
+          <a:p>
+            <a:pPr lvl="1"/>
+            <a:r>
+              <a:rPr lang="en-US" dirty="0"/>
+              <a:t>Exercise all we speak</a:t>
+            </a:r>
+          </a:p>
+          <a:p>
+            <a:r>
+              <a:rPr lang="en-US" dirty="0"/>
+              <a:t>Optional:</a:t>
+            </a:r>
+          </a:p>
+          <a:p>
+            <a:pPr lvl="1"/>
+            <a:r>
+              <a:rPr lang="en-US" dirty="0"/>
+              <a:t>1- Create a helper module for logging, It has an option for the first letter of each log, and then has a service that simply generate logs like these:</a:t>
+            </a:r>
+          </a:p>
+          <a:p>
+            <a:pPr lvl="2"/>
+            <a:r>
+              <a:rPr lang="en-US" dirty="0"/>
+              <a:t>&lt;firs-letter&gt; &lt;passed-argument&gt;</a:t>
+            </a:r>
+          </a:p>
+          <a:p>
+            <a:pPr lvl="2"/>
+            <a:r>
+              <a:rPr lang="en-US" dirty="0"/>
+              <a:t>&gt; some logging</a:t>
+            </a:r>
+          </a:p>
+          <a:p>
+            <a:pPr lvl="1"/>
+            <a:r>
+              <a:rPr lang="en-US" dirty="0"/>
+              <a:t>2- We can inject this logger service in our services and do logging stuffs.</a:t>
+            </a:r>
+          </a:p>
+          <a:p>
+            <a:pPr lvl="1"/>
+            <a:r>
+              <a:rPr lang="en-US" dirty="0"/>
+              <a:t>3- make this prefix optionally configurable for each module.</a:t>
+            </a:r>
+          </a:p>
+          <a:p>
+            <a:pPr lvl="1"/>
+            <a:endParaRPr lang="en-US" dirty="0"/>
+          </a:p>
+        </p:txBody>
+      </p:sp>
+      <p:sp>
+        <p:nvSpPr>
+          <p:cNvPr id="4" name="Footer Placeholder 3">
+            <a:extLst>
+              <a:ext uri="{FF2B5EF4-FFF2-40B4-BE49-F238E27FC236}">
+                <a16:creationId xmlns:a16="http://schemas.microsoft.com/office/drawing/2014/main" id="{E3C0E9F9-B143-43AD-BD5C-508C3E46FF7B}"/>
+              </a:ext>
+            </a:extLst>
+          </p:cNvPr>
+          <p:cNvSpPr>
+            <a:spLocks noGrp="1"/>
+          </p:cNvSpPr>
+          <p:nvPr>
+            <p:ph type="ftr" sz="quarter" idx="11"/>
+          </p:nvPr>
+        </p:nvSpPr>
+        <p:spPr/>
+        <p:txBody>
+          <a:bodyPr/>
+          <a:lstStyle/>
+          <a:p>
+            <a:r>
+              <a:rPr lang="en-US"/>
+              <a:t>Nodejs Basics</a:t>
+            </a:r>
+            <a:endParaRPr lang="en-US" dirty="0"/>
+          </a:p>
+        </p:txBody>
+      </p:sp>
+      <p:sp>
+        <p:nvSpPr>
+          <p:cNvPr id="5" name="Slide Number Placeholder 4">
+            <a:extLst>
+              <a:ext uri="{FF2B5EF4-FFF2-40B4-BE49-F238E27FC236}">
+                <a16:creationId xmlns:a16="http://schemas.microsoft.com/office/drawing/2014/main" id="{1B95C015-BA9F-40C7-A04C-3B835E7354AB}"/>
+              </a:ext>
+            </a:extLst>
+          </p:cNvPr>
+          <p:cNvSpPr>
+            <a:spLocks noGrp="1"/>
+          </p:cNvSpPr>
+          <p:nvPr>
+            <p:ph type="sldNum" sz="quarter" idx="12"/>
+          </p:nvPr>
+        </p:nvSpPr>
+        <p:spPr/>
+        <p:txBody>
+          <a:bodyPr/>
+          <a:lstStyle/>
+          <a:p>
+            <a:fld id="{3A98EE3D-8CD1-4C3F-BD1C-C98C9596463C}" type="slidenum">
+              <a:rPr lang="en-US" smtClean="0"/>
+              <a:t>15</a:t>
+            </a:fld>
+            <a:endParaRPr lang="en-US" dirty="0"/>
+          </a:p>
+        </p:txBody>
+      </p:sp>
+    </p:spTree>
+    <p:extLst>
+      <p:ext uri="{BB962C8B-B14F-4D97-AF65-F5344CB8AC3E}">
+        <p14:creationId xmlns:p14="http://schemas.microsoft.com/office/powerpoint/2010/main" val="817859998"/>
+      </p:ext>
+    </p:extLst>
+  </p:cSld>
+  <p:clrMapOvr>
+    <a:masterClrMapping/>
+  </p:clrMapOvr>
+</p:sld>
+</file>
+
 <file path=ppt/slides/slide2.xml><?xml version="1.0" encoding="utf-8"?>
 <p:sld xmlns:a="http://schemas.openxmlformats.org/drawingml/2006/main" xmlns:r="http://schemas.openxmlformats.org/officeDocument/2006/relationships" xmlns:p="http://schemas.openxmlformats.org/presentationml/2006/main">
   <p:cSld>
@@ -7346,19 +8970,7 @@
               <a:rPr lang="en-US" dirty="0">
                 <a:sym typeface="Wingdings" panose="05000000000000000000" pitchFamily="2" charset="2"/>
               </a:rPr>
-              <a:t>Use static method with some names like: register, </a:t>
-            </a:r>
-            <a:r>
-              <a:rPr lang="en-US" dirty="0" err="1">
-                <a:sym typeface="Wingdings" panose="05000000000000000000" pitchFamily="2" charset="2"/>
-              </a:rPr>
-              <a:t>forRoot</a:t>
-            </a:r>
-            <a:r>
-              <a:rPr lang="en-US" dirty="0">
-                <a:sym typeface="Wingdings" panose="05000000000000000000" pitchFamily="2" charset="2"/>
-              </a:rPr>
-              <a:t>, …</a:t>
+              <a:t>Use static method with some names like: register, forRoot, …</a:t>
             </a:r>
           </a:p>
           <a:p>
@@ -8341,7 +9953,7 @@
           <p:cNvPr id="2" name="Title 1">
             <a:extLst>
               <a:ext uri="{FF2B5EF4-FFF2-40B4-BE49-F238E27FC236}">
-                <a16:creationId xmlns:a16="http://schemas.microsoft.com/office/drawing/2014/main" id="{6B1A0672-14A7-4501-900C-A98EBCCF7AFE}"/>
+                <a16:creationId xmlns:a16="http://schemas.microsoft.com/office/drawing/2014/main" id="{DC238877-F881-448F-BC35-7A666466B9F4}"/>
               </a:ext>
             </a:extLst>
           </p:cNvPr>
@@ -8359,7 +9971,7 @@
           <a:p>
             <a:r>
               <a:rPr lang="en-US" dirty="0"/>
-              <a:t>Exercise</a:t>
+              <a:t>New requirement (dev)</a:t>
             </a:r>
           </a:p>
         </p:txBody>
@@ -8369,7 +9981,7 @@
           <p:cNvPr id="3" name="Content Placeholder 2">
             <a:extLst>
               <a:ext uri="{FF2B5EF4-FFF2-40B4-BE49-F238E27FC236}">
-                <a16:creationId xmlns:a16="http://schemas.microsoft.com/office/drawing/2014/main" id="{2AEB1BE9-8435-42BF-A4F1-2F148FA9187A}"/>
+                <a16:creationId xmlns:a16="http://schemas.microsoft.com/office/drawing/2014/main" id="{FA0540A5-3826-4FBA-AFFE-2137BE1751B3}"/>
               </a:ext>
             </a:extLst>
           </p:cNvPr>
@@ -8387,53 +9999,22 @@
           <a:p>
             <a:r>
               <a:rPr lang="en-US" dirty="0"/>
-              <a:t>Required:</a:t>
+              <a:t>12 factor says:</a:t>
             </a:r>
           </a:p>
           <a:p>
             <a:pPr lvl="1"/>
             <a:r>
               <a:rPr lang="en-US" dirty="0"/>
-              <a:t>Exercise all we speak</a:t>
-            </a:r>
-          </a:p>
-          <a:p>
+              <a:t>Use environment for your app configuration</a:t>
+            </a:r>
+          </a:p>
+          <a:p>
+            <a:pPr lvl="1"/>
             <a:r>
               <a:rPr lang="en-US" dirty="0"/>
-              <a:t>Optional:</a:t>
-            </a:r>
-          </a:p>
-          <a:p>
-            <a:pPr lvl="1"/>
-            <a:r>
-              <a:rPr lang="en-US" dirty="0"/>
-              <a:t>Create a helper module for logging, It has an option for the first letter of each log, and then has a service that simply generate logs like these:</a:t>
-            </a:r>
-          </a:p>
-          <a:p>
-            <a:pPr lvl="2"/>
-            <a:r>
-              <a:rPr lang="en-US" dirty="0"/>
-              <a:t>&lt;firs-letter&gt; &lt;passed-argument&gt;</a:t>
-            </a:r>
-          </a:p>
-          <a:p>
-            <a:pPr lvl="2"/>
-            <a:r>
-              <a:rPr lang="en-US" dirty="0"/>
-              <a:t>&gt; some logging</a:t>
-            </a:r>
-          </a:p>
-          <a:p>
-            <a:pPr lvl="1"/>
-            <a:r>
-              <a:rPr lang="en-US" dirty="0"/>
-              <a:t>We can inject this logger service in our services and do logging stuffs.</a:t>
-            </a:r>
-          </a:p>
-          <a:p>
-            <a:pPr lvl="1"/>
-            <a:endParaRPr lang="en-US" dirty="0"/>
+              <a:t>Rewrite code to use environment variables</a:t>
+            </a:r>
           </a:p>
         </p:txBody>
       </p:sp>
@@ -8442,7 +10023,7 @@
           <p:cNvPr id="4" name="Footer Placeholder 3">
             <a:extLst>
               <a:ext uri="{FF2B5EF4-FFF2-40B4-BE49-F238E27FC236}">
-                <a16:creationId xmlns:a16="http://schemas.microsoft.com/office/drawing/2014/main" id="{E3C0E9F9-B143-43AD-BD5C-508C3E46FF7B}"/>
+                <a16:creationId xmlns:a16="http://schemas.microsoft.com/office/drawing/2014/main" id="{4B5F58A1-71F2-4BA9-92D7-C645AA2AEFA8}"/>
               </a:ext>
             </a:extLst>
           </p:cNvPr>
@@ -8471,7 +10052,7 @@
           <p:cNvPr id="5" name="Slide Number Placeholder 4">
             <a:extLst>
               <a:ext uri="{FF2B5EF4-FFF2-40B4-BE49-F238E27FC236}">
-                <a16:creationId xmlns:a16="http://schemas.microsoft.com/office/drawing/2014/main" id="{1B95C015-BA9F-40C7-A04C-3B835E7354AB}"/>
+                <a16:creationId xmlns:a16="http://schemas.microsoft.com/office/drawing/2014/main" id="{3DB266E6-C948-43C0-A572-04498B0C1CCF}"/>
               </a:ext>
             </a:extLst>
           </p:cNvPr>
@@ -8498,7 +10079,7 @@
     </p:spTree>
     <p:extLst>
       <p:ext uri="{BB962C8B-B14F-4D97-AF65-F5344CB8AC3E}">
-        <p14:creationId xmlns:p14="http://schemas.microsoft.com/office/powerpoint/2010/main" val="817859998"/>
+        <p14:creationId xmlns:p14="http://schemas.microsoft.com/office/powerpoint/2010/main" val="3353917787"/>
       </p:ext>
     </p:extLst>
   </p:cSld>

</xml_diff>